<commit_message>
latest changes to blog
</commit_message>
<xml_diff>
--- a/Blogg-Projektet/Bygga-Blogg.pptx
+++ b/Blogg-Projektet/Bygga-Blogg.pptx
@@ -11,11 +11,16 @@
     <p:sldId id="258" r:id="rId5"/>
     <p:sldId id="259" r:id="rId6"/>
     <p:sldId id="260" r:id="rId7"/>
-    <p:sldId id="261" r:id="rId8"/>
-    <p:sldId id="262" r:id="rId9"/>
-    <p:sldId id="263" r:id="rId10"/>
-    <p:sldId id="265" r:id="rId11"/>
-    <p:sldId id="266" r:id="rId12"/>
+    <p:sldId id="267" r:id="rId8"/>
+    <p:sldId id="268" r:id="rId9"/>
+    <p:sldId id="261" r:id="rId10"/>
+    <p:sldId id="269" r:id="rId11"/>
+    <p:sldId id="263" r:id="rId12"/>
+    <p:sldId id="270" r:id="rId13"/>
+    <p:sldId id="262" r:id="rId14"/>
+    <p:sldId id="272" r:id="rId15"/>
+    <p:sldId id="265" r:id="rId16"/>
+    <p:sldId id="266" r:id="rId17"/>
   </p:sldIdLst>
   <p:sldSz cx="12192000" cy="6858000"/>
   <p:notesSz cx="6858000" cy="9144000"/>
@@ -1334,7 +1339,7 @@
             <a:fld id="{9334D819-9F07-4261-B09B-9E467E5D9002}" type="datetimeFigureOut">
               <a:rPr lang="en-US" dirty="0"/>
               <a:pPr/>
-              <a:t>2/21/2022</a:t>
+              <a:t>3/7/2022</a:t>
             </a:fld>
             <a:endParaRPr lang="en-US" dirty="0"/>
           </a:p>
@@ -1568,7 +1573,7 @@
           <a:p>
             <a:fld id="{9334D819-9F07-4261-B09B-9E467E5D9002}" type="datetimeFigureOut">
               <a:rPr lang="en-US" dirty="0"/>
-              <a:t>2/21/2022</a:t>
+              <a:t>3/7/2022</a:t>
             </a:fld>
             <a:endParaRPr lang="en-US" dirty="0"/>
           </a:p>
@@ -1743,7 +1748,7 @@
           <a:p>
             <a:fld id="{9334D819-9F07-4261-B09B-9E467E5D9002}" type="datetimeFigureOut">
               <a:rPr lang="en-US" dirty="0"/>
-              <a:t>2/21/2022</a:t>
+              <a:t>3/7/2022</a:t>
             </a:fld>
             <a:endParaRPr lang="en-US" dirty="0"/>
           </a:p>
@@ -1908,7 +1913,7 @@
           <a:p>
             <a:fld id="{9334D819-9F07-4261-B09B-9E467E5D9002}" type="datetimeFigureOut">
               <a:rPr lang="en-US" dirty="0"/>
-              <a:t>2/21/2022</a:t>
+              <a:t>3/7/2022</a:t>
             </a:fld>
             <a:endParaRPr lang="en-US" dirty="0"/>
           </a:p>
@@ -2180,7 +2185,7 @@
             <a:fld id="{9334D819-9F07-4261-B09B-9E467E5D9002}" type="datetimeFigureOut">
               <a:rPr lang="en-US" dirty="0"/>
               <a:pPr/>
-              <a:t>2/21/2022</a:t>
+              <a:t>3/7/2022</a:t>
             </a:fld>
             <a:endParaRPr lang="en-US" dirty="0"/>
           </a:p>
@@ -3377,7 +3382,7 @@
           <a:p>
             <a:fld id="{9334D819-9F07-4261-B09B-9E467E5D9002}" type="datetimeFigureOut">
               <a:rPr lang="en-US" dirty="0"/>
-              <a:t>2/21/2022</a:t>
+              <a:t>3/7/2022</a:t>
             </a:fld>
             <a:endParaRPr lang="en-US" dirty="0"/>
           </a:p>
@@ -3762,7 +3767,7 @@
           <a:p>
             <a:fld id="{9334D819-9F07-4261-B09B-9E467E5D9002}" type="datetimeFigureOut">
               <a:rPr lang="en-US" dirty="0"/>
-              <a:t>2/21/2022</a:t>
+              <a:t>3/7/2022</a:t>
             </a:fld>
             <a:endParaRPr lang="en-US" dirty="0"/>
           </a:p>
@@ -3880,7 +3885,7 @@
           <a:p>
             <a:fld id="{9334D819-9F07-4261-B09B-9E467E5D9002}" type="datetimeFigureOut">
               <a:rPr lang="en-US" dirty="0"/>
-              <a:t>2/21/2022</a:t>
+              <a:t>3/7/2022</a:t>
             </a:fld>
             <a:endParaRPr lang="en-US" dirty="0"/>
           </a:p>
@@ -3970,7 +3975,7 @@
           <a:p>
             <a:fld id="{9334D819-9F07-4261-B09B-9E467E5D9002}" type="datetimeFigureOut">
               <a:rPr lang="en-US" dirty="0"/>
-              <a:t>2/21/2022</a:t>
+              <a:t>3/7/2022</a:t>
             </a:fld>
             <a:endParaRPr lang="en-US" dirty="0"/>
           </a:p>
@@ -4728,7 +4733,7 @@
           <a:p>
             <a:fld id="{9334D819-9F07-4261-B09B-9E467E5D9002}" type="datetimeFigureOut">
               <a:rPr lang="en-US" dirty="0"/>
-              <a:t>2/21/2022</a:t>
+              <a:t>3/7/2022</a:t>
             </a:fld>
             <a:endParaRPr lang="en-US" dirty="0"/>
           </a:p>
@@ -5563,7 +5568,7 @@
           <a:p>
             <a:fld id="{9334D819-9F07-4261-B09B-9E467E5D9002}" type="datetimeFigureOut">
               <a:rPr lang="en-US" dirty="0"/>
-              <a:t>2/21/2022</a:t>
+              <a:t>3/7/2022</a:t>
             </a:fld>
             <a:endParaRPr lang="en-US" dirty="0"/>
           </a:p>
@@ -5786,7 +5791,7 @@
             <a:fld id="{9334D819-9F07-4261-B09B-9E467E5D9002}" type="datetimeFigureOut">
               <a:rPr lang="en-US" dirty="0"/>
               <a:pPr/>
-              <a:t>2/21/2022</a:t>
+              <a:t>3/7/2022</a:t>
             </a:fld>
             <a:endParaRPr lang="en-US" dirty="0"/>
           </a:p>
@@ -6855,6 +6860,790 @@
       </p:grpSpPr>
       <p:sp>
         <p:nvSpPr>
+          <p:cNvPr id="2" name="Title 1">
+            <a:extLst>
+              <a:ext uri="{FF2B5EF4-FFF2-40B4-BE49-F238E27FC236}">
+                <a16:creationId xmlns:a16="http://schemas.microsoft.com/office/drawing/2014/main" id="{BEDA65FD-3D77-416A-B570-A96B85A76910}"/>
+              </a:ext>
+            </a:extLst>
+          </p:cNvPr>
+          <p:cNvSpPr>
+            <a:spLocks noGrp="1"/>
+          </p:cNvSpPr>
+          <p:nvPr>
+            <p:ph type="title"/>
+          </p:nvPr>
+        </p:nvSpPr>
+        <p:spPr/>
+        <p:txBody>
+          <a:bodyPr/>
+          <a:lstStyle/>
+          <a:p>
+            <a:r>
+              <a:rPr lang="sv-SE" dirty="0"/>
+              <a:t>Övning </a:t>
+            </a:r>
+            <a:r>
+              <a:rPr lang="sv-SE" dirty="0" err="1"/>
+              <a:t>Markdown</a:t>
+            </a:r>
+            <a:endParaRPr lang="sv-SE" dirty="0"/>
+          </a:p>
+        </p:txBody>
+      </p:sp>
+      <p:sp>
+        <p:nvSpPr>
+          <p:cNvPr id="3" name="Content Placeholder 2">
+            <a:extLst>
+              <a:ext uri="{FF2B5EF4-FFF2-40B4-BE49-F238E27FC236}">
+                <a16:creationId xmlns:a16="http://schemas.microsoft.com/office/drawing/2014/main" id="{B797C07C-5FAB-47E0-BF92-B1D9F66B769E}"/>
+              </a:ext>
+            </a:extLst>
+          </p:cNvPr>
+          <p:cNvSpPr>
+            <a:spLocks noGrp="1"/>
+          </p:cNvSpPr>
+          <p:nvPr>
+            <p:ph idx="1"/>
+          </p:nvPr>
+        </p:nvSpPr>
+        <p:spPr>
+          <a:xfrm>
+            <a:off x="1251678" y="1311565"/>
+            <a:ext cx="10178322" cy="4568028"/>
+          </a:xfrm>
+        </p:spPr>
+        <p:txBody>
+          <a:bodyPr/>
+          <a:lstStyle/>
+          <a:p>
+            <a:r>
+              <a:rPr lang="sv-SE" dirty="0" err="1"/>
+              <a:t>Resultatmall</a:t>
+            </a:r>
+            <a:r>
+              <a:rPr lang="sv-SE" dirty="0"/>
+              <a:t> hemsida för övningen</a:t>
+            </a:r>
+          </a:p>
+          <a:p>
+            <a:pPr lvl="1"/>
+            <a:r>
+              <a:rPr lang="sv-SE" dirty="0">
+                <a:hlinkClick r:id="rId2"/>
+              </a:rPr>
+              <a:t>https://www.w3schools.com/w3css/tryw3css_templates_food_blog.htm </a:t>
+            </a:r>
+            <a:endParaRPr lang="sv-SE" dirty="0"/>
+          </a:p>
+          <a:p>
+            <a:pPr marL="457200" indent="-457200">
+              <a:buFont typeface="+mj-lt"/>
+              <a:buAutoNum type="arabicPeriod"/>
+            </a:pPr>
+            <a:r>
+              <a:rPr lang="sv-SE" dirty="0"/>
+              <a:t>Flytta eller skapa innehållet till rätterna i </a:t>
+            </a:r>
+            <a:r>
+              <a:rPr lang="sv-SE" dirty="0" err="1"/>
+              <a:t>markdown</a:t>
+            </a:r>
+            <a:r>
+              <a:rPr lang="sv-SE" dirty="0"/>
+              <a:t> filer.</a:t>
+            </a:r>
+          </a:p>
+        </p:txBody>
+      </p:sp>
+    </p:spTree>
+    <p:extLst>
+      <p:ext uri="{BB962C8B-B14F-4D97-AF65-F5344CB8AC3E}">
+        <p14:creationId xmlns:p14="http://schemas.microsoft.com/office/powerpoint/2010/main" val="4140980502"/>
+      </p:ext>
+    </p:extLst>
+  </p:cSld>
+  <p:clrMapOvr>
+    <a:masterClrMapping/>
+  </p:clrMapOvr>
+</p:sld>
+</file>
+
+<file path=ppt/slides/slide11.xml><?xml version="1.0" encoding="utf-8"?>
+<p:sld xmlns:a="http://schemas.openxmlformats.org/drawingml/2006/main" xmlns:r="http://schemas.openxmlformats.org/officeDocument/2006/relationships" xmlns:p="http://schemas.openxmlformats.org/presentationml/2006/main">
+  <p:cSld>
+    <p:spTree>
+      <p:nvGrpSpPr>
+        <p:cNvPr id="1" name=""/>
+        <p:cNvGrpSpPr/>
+        <p:nvPr/>
+      </p:nvGrpSpPr>
+      <p:grpSpPr>
+        <a:xfrm>
+          <a:off x="0" y="0"/>
+          <a:ext cx="0" cy="0"/>
+          <a:chOff x="0" y="0"/>
+          <a:chExt cx="0" cy="0"/>
+        </a:xfrm>
+      </p:grpSpPr>
+      <p:sp>
+        <p:nvSpPr>
+          <p:cNvPr id="2" name="Rubrik 1">
+            <a:extLst>
+              <a:ext uri="{FF2B5EF4-FFF2-40B4-BE49-F238E27FC236}">
+                <a16:creationId xmlns:a16="http://schemas.microsoft.com/office/drawing/2014/main" id="{9F0ADFF8-1E17-4F74-BA67-DB5F579A07F5}"/>
+              </a:ext>
+            </a:extLst>
+          </p:cNvPr>
+          <p:cNvSpPr>
+            <a:spLocks noGrp="1"/>
+          </p:cNvSpPr>
+          <p:nvPr>
+            <p:ph type="title"/>
+          </p:nvPr>
+        </p:nvSpPr>
+        <p:spPr/>
+        <p:txBody>
+          <a:bodyPr/>
+          <a:lstStyle/>
+          <a:p>
+            <a:r>
+              <a:rPr lang="sv-SE" dirty="0"/>
+              <a:t>Del 1 - Gå igenom </a:t>
+            </a:r>
+            <a:r>
+              <a:rPr lang="sv-SE" dirty="0" err="1"/>
+              <a:t>nuxt</a:t>
+            </a:r>
+            <a:r>
+              <a:rPr lang="sv-SE" dirty="0"/>
+              <a:t> </a:t>
+            </a:r>
+            <a:r>
+              <a:rPr lang="sv-SE" dirty="0" err="1"/>
+              <a:t>content</a:t>
+            </a:r>
+            <a:endParaRPr lang="sv-SE" dirty="0"/>
+          </a:p>
+        </p:txBody>
+      </p:sp>
+      <p:sp>
+        <p:nvSpPr>
+          <p:cNvPr id="3" name="Platshållare för innehåll 2">
+            <a:extLst>
+              <a:ext uri="{FF2B5EF4-FFF2-40B4-BE49-F238E27FC236}">
+                <a16:creationId xmlns:a16="http://schemas.microsoft.com/office/drawing/2014/main" id="{8DE49576-57BB-46F0-8576-44762A044073}"/>
+              </a:ext>
+            </a:extLst>
+          </p:cNvPr>
+          <p:cNvSpPr>
+            <a:spLocks noGrp="1"/>
+          </p:cNvSpPr>
+          <p:nvPr>
+            <p:ph idx="1"/>
+          </p:nvPr>
+        </p:nvSpPr>
+        <p:spPr/>
+        <p:txBody>
+          <a:bodyPr/>
+          <a:lstStyle/>
+          <a:p>
+            <a:r>
+              <a:rPr lang="sv-SE" dirty="0" err="1"/>
+              <a:t>Nuxt</a:t>
+            </a:r>
+            <a:r>
+              <a:rPr lang="sv-SE" dirty="0"/>
+              <a:t> </a:t>
+            </a:r>
+            <a:r>
+              <a:rPr lang="sv-SE" dirty="0" err="1"/>
+              <a:t>Content</a:t>
+            </a:r>
+            <a:r>
+              <a:rPr lang="sv-SE" dirty="0"/>
+              <a:t> är en modul i </a:t>
+            </a:r>
+            <a:r>
+              <a:rPr lang="sv-SE" dirty="0" err="1"/>
+              <a:t>Nuxt</a:t>
+            </a:r>
+            <a:r>
+              <a:rPr lang="sv-SE" dirty="0"/>
+              <a:t> som tillåter oss läsa in innehållet i olika filer genom ett smidigt API.</a:t>
+            </a:r>
+          </a:p>
+          <a:p>
+            <a:r>
+              <a:rPr lang="sv-SE" dirty="0">
+                <a:hlinkClick r:id="rId2"/>
+              </a:rPr>
+              <a:t>https://content.nuxtjs.org/</a:t>
+            </a:r>
+            <a:endParaRPr lang="sv-SE" dirty="0"/>
+          </a:p>
+          <a:p>
+            <a:endParaRPr lang="sv-SE" dirty="0"/>
+          </a:p>
+        </p:txBody>
+      </p:sp>
+      <p:pic>
+        <p:nvPicPr>
+          <p:cNvPr id="5122" name="Picture 2" descr="nuxt/content - npm">
+            <a:extLst>
+              <a:ext uri="{FF2B5EF4-FFF2-40B4-BE49-F238E27FC236}">
+                <a16:creationId xmlns:a16="http://schemas.microsoft.com/office/drawing/2014/main" id="{2A127A15-05E4-4157-A58C-0C51DF09665D}"/>
+              </a:ext>
+            </a:extLst>
+          </p:cNvPr>
+          <p:cNvPicPr>
+            <a:picLocks noChangeAspect="1" noChangeArrowheads="1"/>
+          </p:cNvPicPr>
+          <p:nvPr/>
+        </p:nvPicPr>
+        <p:blipFill>
+          <a:blip r:embed="rId3">
+            <a:extLst>
+              <a:ext uri="{28A0092B-C50C-407E-A947-70E740481C1C}">
+                <a14:useLocalDpi xmlns:a14="http://schemas.microsoft.com/office/drawing/2010/main" val="0"/>
+              </a:ext>
+            </a:extLst>
+          </a:blip>
+          <a:srcRect/>
+          <a:stretch>
+            <a:fillRect/>
+          </a:stretch>
+        </p:blipFill>
+        <p:spPr bwMode="auto">
+          <a:xfrm>
+            <a:off x="4815280" y="3214864"/>
+            <a:ext cx="6890158" cy="3445079"/>
+          </a:xfrm>
+          <a:prstGeom prst="rect">
+            <a:avLst/>
+          </a:prstGeom>
+          <a:noFill/>
+          <a:extLst>
+            <a:ext uri="{909E8E84-426E-40DD-AFC4-6F175D3DCCD1}">
+              <a14:hiddenFill xmlns:a14="http://schemas.microsoft.com/office/drawing/2010/main">
+                <a:solidFill>
+                  <a:srgbClr val="FFFFFF"/>
+                </a:solidFill>
+              </a14:hiddenFill>
+            </a:ext>
+          </a:extLst>
+        </p:spPr>
+      </p:pic>
+    </p:spTree>
+    <p:extLst>
+      <p:ext uri="{BB962C8B-B14F-4D97-AF65-F5344CB8AC3E}">
+        <p14:creationId xmlns:p14="http://schemas.microsoft.com/office/powerpoint/2010/main" val="2592613988"/>
+      </p:ext>
+    </p:extLst>
+  </p:cSld>
+  <p:clrMapOvr>
+    <a:masterClrMapping/>
+  </p:clrMapOvr>
+</p:sld>
+</file>
+
+<file path=ppt/slides/slide12.xml><?xml version="1.0" encoding="utf-8"?>
+<p:sld xmlns:a="http://schemas.openxmlformats.org/drawingml/2006/main" xmlns:r="http://schemas.openxmlformats.org/officeDocument/2006/relationships" xmlns:p="http://schemas.openxmlformats.org/presentationml/2006/main">
+  <p:cSld>
+    <p:spTree>
+      <p:nvGrpSpPr>
+        <p:cNvPr id="1" name=""/>
+        <p:cNvGrpSpPr/>
+        <p:nvPr/>
+      </p:nvGrpSpPr>
+      <p:grpSpPr>
+        <a:xfrm>
+          <a:off x="0" y="0"/>
+          <a:ext cx="0" cy="0"/>
+          <a:chOff x="0" y="0"/>
+          <a:chExt cx="0" cy="0"/>
+        </a:xfrm>
+      </p:grpSpPr>
+      <p:sp>
+        <p:nvSpPr>
+          <p:cNvPr id="2" name="Title 1">
+            <a:extLst>
+              <a:ext uri="{FF2B5EF4-FFF2-40B4-BE49-F238E27FC236}">
+                <a16:creationId xmlns:a16="http://schemas.microsoft.com/office/drawing/2014/main" id="{BEDA65FD-3D77-416A-B570-A96B85A76910}"/>
+              </a:ext>
+            </a:extLst>
+          </p:cNvPr>
+          <p:cNvSpPr>
+            <a:spLocks noGrp="1"/>
+          </p:cNvSpPr>
+          <p:nvPr>
+            <p:ph type="title"/>
+          </p:nvPr>
+        </p:nvSpPr>
+        <p:spPr/>
+        <p:txBody>
+          <a:bodyPr/>
+          <a:lstStyle/>
+          <a:p>
+            <a:r>
+              <a:rPr lang="sv-SE" dirty="0"/>
+              <a:t>Övning </a:t>
+            </a:r>
+            <a:r>
+              <a:rPr lang="sv-SE" dirty="0" err="1"/>
+              <a:t>Nuxt-content</a:t>
+            </a:r>
+            <a:endParaRPr lang="sv-SE" dirty="0"/>
+          </a:p>
+        </p:txBody>
+      </p:sp>
+      <p:sp>
+        <p:nvSpPr>
+          <p:cNvPr id="3" name="Content Placeholder 2">
+            <a:extLst>
+              <a:ext uri="{FF2B5EF4-FFF2-40B4-BE49-F238E27FC236}">
+                <a16:creationId xmlns:a16="http://schemas.microsoft.com/office/drawing/2014/main" id="{B797C07C-5FAB-47E0-BF92-B1D9F66B769E}"/>
+              </a:ext>
+            </a:extLst>
+          </p:cNvPr>
+          <p:cNvSpPr>
+            <a:spLocks noGrp="1"/>
+          </p:cNvSpPr>
+          <p:nvPr>
+            <p:ph idx="1"/>
+          </p:nvPr>
+        </p:nvSpPr>
+        <p:spPr>
+          <a:xfrm>
+            <a:off x="1251678" y="1311565"/>
+            <a:ext cx="10178322" cy="4568028"/>
+          </a:xfrm>
+        </p:spPr>
+        <p:txBody>
+          <a:bodyPr/>
+          <a:lstStyle/>
+          <a:p>
+            <a:r>
+              <a:rPr lang="sv-SE" dirty="0" err="1"/>
+              <a:t>Resultatmall</a:t>
+            </a:r>
+            <a:r>
+              <a:rPr lang="sv-SE" dirty="0"/>
+              <a:t> hemsida för övningen</a:t>
+            </a:r>
+          </a:p>
+          <a:p>
+            <a:pPr lvl="1"/>
+            <a:r>
+              <a:rPr lang="sv-SE" dirty="0">
+                <a:hlinkClick r:id="rId2"/>
+              </a:rPr>
+              <a:t>https://www.w3schools.com/w3css/tryw3css_templates_food_blog.htm </a:t>
+            </a:r>
+            <a:endParaRPr lang="sv-SE" dirty="0"/>
+          </a:p>
+          <a:p>
+            <a:pPr marL="457200" indent="-457200">
+              <a:buFont typeface="+mj-lt"/>
+              <a:buAutoNum type="arabicPeriod"/>
+            </a:pPr>
+            <a:r>
+              <a:rPr lang="sv-SE" dirty="0"/>
+              <a:t>Läs in innehållet från </a:t>
+            </a:r>
+            <a:r>
+              <a:rPr lang="sv-SE" dirty="0" err="1"/>
+              <a:t>markdown</a:t>
+            </a:r>
+            <a:r>
+              <a:rPr lang="sv-SE" dirty="0"/>
+              <a:t> filerna till </a:t>
+            </a:r>
+            <a:r>
+              <a:rPr lang="sv-SE" dirty="0" err="1"/>
+              <a:t>appens</a:t>
+            </a:r>
+            <a:r>
+              <a:rPr lang="sv-SE" dirty="0"/>
+              <a:t> sidor och visa det istället för hårdkodat.</a:t>
+            </a:r>
+          </a:p>
+        </p:txBody>
+      </p:sp>
+    </p:spTree>
+    <p:extLst>
+      <p:ext uri="{BB962C8B-B14F-4D97-AF65-F5344CB8AC3E}">
+        <p14:creationId xmlns:p14="http://schemas.microsoft.com/office/powerpoint/2010/main" val="3786204253"/>
+      </p:ext>
+    </p:extLst>
+  </p:cSld>
+  <p:clrMapOvr>
+    <a:masterClrMapping/>
+  </p:clrMapOvr>
+</p:sld>
+</file>
+
+<file path=ppt/slides/slide13.xml><?xml version="1.0" encoding="utf-8"?>
+<p:sld xmlns:a="http://schemas.openxmlformats.org/drawingml/2006/main" xmlns:r="http://schemas.openxmlformats.org/officeDocument/2006/relationships" xmlns:p="http://schemas.openxmlformats.org/presentationml/2006/main">
+  <p:cSld>
+    <p:spTree>
+      <p:nvGrpSpPr>
+        <p:cNvPr id="1" name=""/>
+        <p:cNvGrpSpPr/>
+        <p:nvPr/>
+      </p:nvGrpSpPr>
+      <p:grpSpPr>
+        <a:xfrm>
+          <a:off x="0" y="0"/>
+          <a:ext cx="0" cy="0"/>
+          <a:chOff x="0" y="0"/>
+          <a:chExt cx="0" cy="0"/>
+        </a:xfrm>
+      </p:grpSpPr>
+      <p:sp>
+        <p:nvSpPr>
+          <p:cNvPr id="2" name="Rubrik 1">
+            <a:extLst>
+              <a:ext uri="{FF2B5EF4-FFF2-40B4-BE49-F238E27FC236}">
+                <a16:creationId xmlns:a16="http://schemas.microsoft.com/office/drawing/2014/main" id="{05C3A82D-CA9E-4A0A-87F6-169B6E2C794A}"/>
+              </a:ext>
+            </a:extLst>
+          </p:cNvPr>
+          <p:cNvSpPr>
+            <a:spLocks noGrp="1"/>
+          </p:cNvSpPr>
+          <p:nvPr>
+            <p:ph type="title"/>
+          </p:nvPr>
+        </p:nvSpPr>
+        <p:spPr/>
+        <p:txBody>
+          <a:bodyPr/>
+          <a:lstStyle/>
+          <a:p>
+            <a:r>
+              <a:rPr lang="sv-SE" dirty="0"/>
+              <a:t>Del 1 - Gå igenom </a:t>
+            </a:r>
+            <a:r>
+              <a:rPr lang="sv-SE" dirty="0" err="1"/>
+              <a:t>tailwind</a:t>
+            </a:r>
+            <a:r>
+              <a:rPr lang="sv-SE" dirty="0"/>
+              <a:t> </a:t>
+            </a:r>
+            <a:r>
+              <a:rPr lang="sv-SE" dirty="0" err="1"/>
+              <a:t>css</a:t>
+            </a:r>
+            <a:endParaRPr lang="sv-SE" dirty="0"/>
+          </a:p>
+        </p:txBody>
+      </p:sp>
+      <p:sp>
+        <p:nvSpPr>
+          <p:cNvPr id="3" name="Platshållare för innehåll 2">
+            <a:extLst>
+              <a:ext uri="{FF2B5EF4-FFF2-40B4-BE49-F238E27FC236}">
+                <a16:creationId xmlns:a16="http://schemas.microsoft.com/office/drawing/2014/main" id="{78144C54-324B-4092-9293-999171D88805}"/>
+              </a:ext>
+            </a:extLst>
+          </p:cNvPr>
+          <p:cNvSpPr>
+            <a:spLocks noGrp="1"/>
+          </p:cNvSpPr>
+          <p:nvPr>
+            <p:ph idx="1"/>
+          </p:nvPr>
+        </p:nvSpPr>
+        <p:spPr>
+          <a:xfrm>
+            <a:off x="1251678" y="1744911"/>
+            <a:ext cx="10178322" cy="4134682"/>
+          </a:xfrm>
+        </p:spPr>
+        <p:txBody>
+          <a:bodyPr/>
+          <a:lstStyle/>
+          <a:p>
+            <a:r>
+              <a:rPr lang="sv-SE" dirty="0" err="1"/>
+              <a:t>Tailwind</a:t>
+            </a:r>
+            <a:r>
+              <a:rPr lang="sv-SE" dirty="0"/>
+              <a:t> CSS är ett CSS bibliotek som tillhandahåller en mängd klasser som gör det enkelt att applicera CSS på applikationer.</a:t>
+            </a:r>
+          </a:p>
+          <a:p>
+            <a:r>
+              <a:rPr lang="sv-SE" dirty="0" err="1"/>
+              <a:t>Tailwind</a:t>
+            </a:r>
+            <a:r>
+              <a:rPr lang="sv-SE" dirty="0"/>
+              <a:t> CSS hemsida</a:t>
+            </a:r>
+          </a:p>
+          <a:p>
+            <a:pPr lvl="1"/>
+            <a:r>
+              <a:rPr lang="sv-SE" dirty="0">
+                <a:hlinkClick r:id="rId2"/>
+              </a:rPr>
+              <a:t>https://tailwindcss.com/</a:t>
+            </a:r>
+            <a:endParaRPr lang="sv-SE" dirty="0"/>
+          </a:p>
+          <a:p>
+            <a:r>
+              <a:rPr lang="sv-SE" dirty="0"/>
+              <a:t>Bra video om </a:t>
+            </a:r>
+            <a:r>
+              <a:rPr lang="sv-SE" dirty="0" err="1"/>
+              <a:t>Tailwind</a:t>
+            </a:r>
+            <a:r>
+              <a:rPr lang="sv-SE" dirty="0"/>
+              <a:t> och övningar:</a:t>
+            </a:r>
+          </a:p>
+          <a:p>
+            <a:pPr lvl="1"/>
+            <a:r>
+              <a:rPr lang="sv-SE" dirty="0">
+                <a:hlinkClick r:id="rId3"/>
+              </a:rPr>
+              <a:t>https://www.youtube.com/watch?v=4wGmylafgM4</a:t>
+            </a:r>
+            <a:endParaRPr lang="sv-SE" dirty="0"/>
+          </a:p>
+          <a:p>
+            <a:r>
+              <a:rPr lang="sv-SE" dirty="0" err="1"/>
+              <a:t>Pdf:en</a:t>
+            </a:r>
+            <a:r>
+              <a:rPr lang="sv-SE" dirty="0"/>
+              <a:t> till videon finns i samma mapp som den här presentationen. </a:t>
+            </a:r>
+          </a:p>
+        </p:txBody>
+      </p:sp>
+      <p:pic>
+        <p:nvPicPr>
+          <p:cNvPr id="3074" name="Picture 2" descr="11 Benefits of Tailwind CSS | Laravel News">
+            <a:extLst>
+              <a:ext uri="{FF2B5EF4-FFF2-40B4-BE49-F238E27FC236}">
+                <a16:creationId xmlns:a16="http://schemas.microsoft.com/office/drawing/2014/main" id="{30893E99-B6F8-41DF-8634-26E25DFF94EF}"/>
+              </a:ext>
+            </a:extLst>
+          </p:cNvPr>
+          <p:cNvPicPr>
+            <a:picLocks noChangeAspect="1" noChangeArrowheads="1"/>
+          </p:cNvPicPr>
+          <p:nvPr/>
+        </p:nvPicPr>
+        <p:blipFill>
+          <a:blip r:embed="rId4">
+            <a:extLst>
+              <a:ext uri="{28A0092B-C50C-407E-A947-70E740481C1C}">
+                <a14:useLocalDpi xmlns:a14="http://schemas.microsoft.com/office/drawing/2010/main" val="0"/>
+              </a:ext>
+            </a:extLst>
+          </a:blip>
+          <a:srcRect/>
+          <a:stretch>
+            <a:fillRect/>
+          </a:stretch>
+        </p:blipFill>
+        <p:spPr bwMode="auto">
+          <a:xfrm>
+            <a:off x="7518689" y="4961140"/>
+            <a:ext cx="3028950" cy="1514475"/>
+          </a:xfrm>
+          <a:prstGeom prst="rect">
+            <a:avLst/>
+          </a:prstGeom>
+          <a:noFill/>
+          <a:extLst>
+            <a:ext uri="{909E8E84-426E-40DD-AFC4-6F175D3DCCD1}">
+              <a14:hiddenFill xmlns:a14="http://schemas.microsoft.com/office/drawing/2010/main">
+                <a:solidFill>
+                  <a:srgbClr val="FFFFFF"/>
+                </a:solidFill>
+              </a14:hiddenFill>
+            </a:ext>
+          </a:extLst>
+        </p:spPr>
+      </p:pic>
+    </p:spTree>
+    <p:extLst>
+      <p:ext uri="{BB962C8B-B14F-4D97-AF65-F5344CB8AC3E}">
+        <p14:creationId xmlns:p14="http://schemas.microsoft.com/office/powerpoint/2010/main" val="1683908177"/>
+      </p:ext>
+    </p:extLst>
+  </p:cSld>
+  <p:clrMapOvr>
+    <a:masterClrMapping/>
+  </p:clrMapOvr>
+</p:sld>
+</file>
+
+<file path=ppt/slides/slide14.xml><?xml version="1.0" encoding="utf-8"?>
+<p:sld xmlns:a="http://schemas.openxmlformats.org/drawingml/2006/main" xmlns:r="http://schemas.openxmlformats.org/officeDocument/2006/relationships" xmlns:p="http://schemas.openxmlformats.org/presentationml/2006/main">
+  <p:cSld>
+    <p:spTree>
+      <p:nvGrpSpPr>
+        <p:cNvPr id="1" name=""/>
+        <p:cNvGrpSpPr/>
+        <p:nvPr/>
+      </p:nvGrpSpPr>
+      <p:grpSpPr>
+        <a:xfrm>
+          <a:off x="0" y="0"/>
+          <a:ext cx="0" cy="0"/>
+          <a:chOff x="0" y="0"/>
+          <a:chExt cx="0" cy="0"/>
+        </a:xfrm>
+      </p:grpSpPr>
+      <p:sp>
+        <p:nvSpPr>
+          <p:cNvPr id="2" name="Title 1">
+            <a:extLst>
+              <a:ext uri="{FF2B5EF4-FFF2-40B4-BE49-F238E27FC236}">
+                <a16:creationId xmlns:a16="http://schemas.microsoft.com/office/drawing/2014/main" id="{BEDA65FD-3D77-416A-B570-A96B85A76910}"/>
+              </a:ext>
+            </a:extLst>
+          </p:cNvPr>
+          <p:cNvSpPr>
+            <a:spLocks noGrp="1"/>
+          </p:cNvSpPr>
+          <p:nvPr>
+            <p:ph type="title"/>
+          </p:nvPr>
+        </p:nvSpPr>
+        <p:spPr/>
+        <p:txBody>
+          <a:bodyPr/>
+          <a:lstStyle/>
+          <a:p>
+            <a:r>
+              <a:rPr lang="sv-SE" dirty="0"/>
+              <a:t>Övning </a:t>
+            </a:r>
+            <a:r>
+              <a:rPr lang="sv-SE" dirty="0" err="1"/>
+              <a:t>Tailwind</a:t>
+            </a:r>
+            <a:r>
+              <a:rPr lang="sv-SE" dirty="0"/>
+              <a:t> CSs</a:t>
+            </a:r>
+          </a:p>
+        </p:txBody>
+      </p:sp>
+      <p:sp>
+        <p:nvSpPr>
+          <p:cNvPr id="3" name="Content Placeholder 2">
+            <a:extLst>
+              <a:ext uri="{FF2B5EF4-FFF2-40B4-BE49-F238E27FC236}">
+                <a16:creationId xmlns:a16="http://schemas.microsoft.com/office/drawing/2014/main" id="{B797C07C-5FAB-47E0-BF92-B1D9F66B769E}"/>
+              </a:ext>
+            </a:extLst>
+          </p:cNvPr>
+          <p:cNvSpPr>
+            <a:spLocks noGrp="1"/>
+          </p:cNvSpPr>
+          <p:nvPr>
+            <p:ph idx="1"/>
+          </p:nvPr>
+        </p:nvSpPr>
+        <p:spPr>
+          <a:xfrm>
+            <a:off x="1251678" y="1311565"/>
+            <a:ext cx="10178322" cy="4568028"/>
+          </a:xfrm>
+        </p:spPr>
+        <p:txBody>
+          <a:bodyPr/>
+          <a:lstStyle/>
+          <a:p>
+            <a:r>
+              <a:rPr lang="sv-SE" dirty="0" err="1"/>
+              <a:t>Resultatmall</a:t>
+            </a:r>
+            <a:r>
+              <a:rPr lang="sv-SE" dirty="0"/>
+              <a:t> hemsida för övningen</a:t>
+            </a:r>
+          </a:p>
+          <a:p>
+            <a:pPr lvl="1"/>
+            <a:r>
+              <a:rPr lang="sv-SE" dirty="0">
+                <a:hlinkClick r:id="rId2"/>
+              </a:rPr>
+              <a:t>https://www.w3schools.com/w3css/tryw3css_templates_food_blog.htm </a:t>
+            </a:r>
+            <a:endParaRPr lang="sv-SE" dirty="0"/>
+          </a:p>
+          <a:p>
+            <a:r>
+              <a:rPr lang="sv-SE" dirty="0"/>
+              <a:t>Applicera design och utseende på hemsidan så den ser ut som länken.</a:t>
+            </a:r>
+          </a:p>
+          <a:p>
+            <a:r>
+              <a:rPr lang="sv-SE" dirty="0"/>
+              <a:t>Använd </a:t>
+            </a:r>
+            <a:r>
+              <a:rPr lang="sv-SE" dirty="0" err="1"/>
+              <a:t>Tailwind</a:t>
+            </a:r>
+            <a:r>
+              <a:rPr lang="sv-SE" dirty="0"/>
+              <a:t> CSS.</a:t>
+            </a:r>
+          </a:p>
+        </p:txBody>
+      </p:sp>
+    </p:spTree>
+    <p:extLst>
+      <p:ext uri="{BB962C8B-B14F-4D97-AF65-F5344CB8AC3E}">
+        <p14:creationId xmlns:p14="http://schemas.microsoft.com/office/powerpoint/2010/main" val="871754347"/>
+      </p:ext>
+    </p:extLst>
+  </p:cSld>
+  <p:clrMapOvr>
+    <a:masterClrMapping/>
+  </p:clrMapOvr>
+</p:sld>
+</file>
+
+<file path=ppt/slides/slide15.xml><?xml version="1.0" encoding="utf-8"?>
+<p:sld xmlns:a="http://schemas.openxmlformats.org/drawingml/2006/main" xmlns:r="http://schemas.openxmlformats.org/officeDocument/2006/relationships" xmlns:p="http://schemas.openxmlformats.org/presentationml/2006/main">
+  <p:cSld>
+    <p:spTree>
+      <p:nvGrpSpPr>
+        <p:cNvPr id="1" name=""/>
+        <p:cNvGrpSpPr/>
+        <p:nvPr/>
+      </p:nvGrpSpPr>
+      <p:grpSpPr>
+        <a:xfrm>
+          <a:off x="0" y="0"/>
+          <a:ext cx="0" cy="0"/>
+          <a:chOff x="0" y="0"/>
+          <a:chExt cx="0" cy="0"/>
+        </a:xfrm>
+      </p:grpSpPr>
+      <p:sp>
+        <p:nvSpPr>
           <p:cNvPr id="2" name="Rubrik 1">
             <a:extLst>
               <a:ext uri="{FF2B5EF4-FFF2-40B4-BE49-F238E27FC236}">
@@ -6946,7 +7735,7 @@
 </p:sld>
 </file>
 
-<file path=ppt/slides/slide11.xml><?xml version="1.0" encoding="utf-8"?>
+<file path=ppt/slides/slide16.xml><?xml version="1.0" encoding="utf-8"?>
 <p:sld xmlns:a="http://schemas.openxmlformats.org/drawingml/2006/main" xmlns:r="http://schemas.openxmlformats.org/officeDocument/2006/relationships" xmlns:p="http://schemas.openxmlformats.org/presentationml/2006/main">
   <p:cSld>
     <p:spTree>
@@ -7343,17 +8132,6 @@
             <a:pPr lvl="1"/>
             <a:r>
               <a:rPr lang="sv-SE" dirty="0" err="1"/>
-              <a:t>Tailwind</a:t>
-            </a:r>
-            <a:r>
-              <a:rPr lang="sv-SE" dirty="0"/>
-              <a:t> CSS</a:t>
-            </a:r>
-          </a:p>
-          <a:p>
-            <a:pPr lvl="1"/>
-            <a:r>
-              <a:rPr lang="sv-SE" dirty="0" err="1"/>
               <a:t>Nuxt</a:t>
             </a:r>
             <a:r>
@@ -7363,6 +8141,18 @@
             <a:r>
               <a:rPr lang="sv-SE" dirty="0" err="1"/>
               <a:t>Content</a:t>
+            </a:r>
+            <a:endParaRPr lang="sv-SE" dirty="0"/>
+          </a:p>
+          <a:p>
+            <a:pPr lvl="1"/>
+            <a:r>
+              <a:rPr lang="sv-SE" dirty="0" err="1"/>
+              <a:t>Tailwind</a:t>
+            </a:r>
+            <a:r>
+              <a:rPr lang="sv-SE" dirty="0"/>
+              <a:t> CSS</a:t>
             </a:r>
             <a:br>
               <a:rPr lang="sv-SE" dirty="0"/>
@@ -8149,10 +8939,10 @@
       </p:grpSpPr>
       <p:sp>
         <p:nvSpPr>
-          <p:cNvPr id="2" name="Rubrik 1">
+          <p:cNvPr id="2" name="Title 1">
             <a:extLst>
               <a:ext uri="{FF2B5EF4-FFF2-40B4-BE49-F238E27FC236}">
-                <a16:creationId xmlns:a16="http://schemas.microsoft.com/office/drawing/2014/main" id="{A1B76055-3CFF-4EC0-B3F0-EF5DC34CA8A6}"/>
+                <a16:creationId xmlns:a16="http://schemas.microsoft.com/office/drawing/2014/main" id="{B2886C44-2DD4-41EB-A768-DA8C66F1F237}"/>
               </a:ext>
             </a:extLst>
           </p:cNvPr>
@@ -8170,166 +8960,53 @@
           <a:p>
             <a:r>
               <a:rPr lang="sv-SE" dirty="0"/>
-              <a:t>Del 1 - Gå igenom </a:t>
+              <a:t>Skapa ett </a:t>
             </a:r>
             <a:r>
               <a:rPr lang="sv-SE" dirty="0" err="1"/>
-              <a:t>Markdown</a:t>
-            </a:r>
-            <a:endParaRPr lang="sv-SE" dirty="0"/>
+              <a:t>nuxt</a:t>
+            </a:r>
+            <a:r>
+              <a:rPr lang="sv-SE" dirty="0"/>
+              <a:t> projekt</a:t>
+            </a:r>
           </a:p>
         </p:txBody>
       </p:sp>
-      <p:sp>
-        <p:nvSpPr>
-          <p:cNvPr id="3" name="Platshållare för innehåll 2">
+      <p:pic>
+        <p:nvPicPr>
+          <p:cNvPr id="7" name="Picture 6">
             <a:extLst>
               <a:ext uri="{FF2B5EF4-FFF2-40B4-BE49-F238E27FC236}">
-                <a16:creationId xmlns:a16="http://schemas.microsoft.com/office/drawing/2014/main" id="{A87E6BA1-2E29-47B1-B6F5-CFADF72C07C0}"/>
+                <a16:creationId xmlns:a16="http://schemas.microsoft.com/office/drawing/2014/main" id="{A980E97F-B01E-464E-80A6-11F8888D6459}"/>
               </a:ext>
             </a:extLst>
           </p:cNvPr>
-          <p:cNvSpPr>
-            <a:spLocks noGrp="1"/>
-          </p:cNvSpPr>
-          <p:nvPr>
-            <p:ph idx="1"/>
-          </p:nvPr>
-        </p:nvSpPr>
+          <p:cNvPicPr>
+            <a:picLocks noChangeAspect="1"/>
+          </p:cNvPicPr>
+          <p:nvPr/>
+        </p:nvPicPr>
+        <p:blipFill>
+          <a:blip r:embed="rId2"/>
+          <a:stretch>
+            <a:fillRect/>
+          </a:stretch>
+        </p:blipFill>
         <p:spPr>
           <a:xfrm>
-            <a:off x="1251678" y="1342239"/>
-            <a:ext cx="10178322" cy="5301842"/>
+            <a:off x="1251678" y="1232366"/>
+            <a:ext cx="8372475" cy="3771900"/>
           </a:xfrm>
+          <a:prstGeom prst="rect">
+            <a:avLst/>
+          </a:prstGeom>
         </p:spPr>
-        <p:txBody>
-          <a:bodyPr/>
-          <a:lstStyle/>
-          <a:p>
-            <a:r>
-              <a:rPr lang="sv-SE" dirty="0" err="1"/>
-              <a:t>Markdown</a:t>
-            </a:r>
-            <a:r>
-              <a:rPr lang="sv-SE" dirty="0"/>
-              <a:t> är ett märkspråk för ren text som sedan kan konverteras till många olika format (</a:t>
-            </a:r>
-            <a:r>
-              <a:rPr lang="sv-SE" dirty="0" err="1"/>
-              <a:t>pdf</a:t>
-            </a:r>
-            <a:r>
-              <a:rPr lang="sv-SE" dirty="0"/>
-              <a:t>, HTML, </a:t>
-            </a:r>
-            <a:r>
-              <a:rPr lang="sv-SE" dirty="0" err="1"/>
-              <a:t>wordfil</a:t>
-            </a:r>
-            <a:r>
-              <a:rPr lang="sv-SE" dirty="0"/>
-              <a:t>)</a:t>
-            </a:r>
-            <a:br>
-              <a:rPr lang="sv-SE" dirty="0"/>
-            </a:br>
-            <a:endParaRPr lang="sv-SE" dirty="0"/>
-          </a:p>
-          <a:p>
-            <a:r>
-              <a:rPr lang="sv-SE" dirty="0"/>
-              <a:t>Syftet med </a:t>
-            </a:r>
-            <a:r>
-              <a:rPr lang="sv-SE" dirty="0" err="1"/>
-              <a:t>markdown</a:t>
-            </a:r>
-            <a:r>
-              <a:rPr lang="sv-SE" dirty="0"/>
-              <a:t> är att man enkelt ska kunna läsa och skriva läsbar ren text, men med möjligheten att sedan kunna konvertera texten till strukturerad, rik text.</a:t>
-            </a:r>
-            <a:br>
-              <a:rPr lang="sv-SE" dirty="0"/>
-            </a:br>
-            <a:endParaRPr lang="sv-SE" dirty="0"/>
-          </a:p>
-          <a:p>
-            <a:r>
-              <a:rPr lang="sv-SE" dirty="0"/>
-              <a:t>Syntaxen för att formatera texten för fet och kursiv stil, rubriker och punktlistor är förenklad jämfört med html-kod.</a:t>
-            </a:r>
-            <a:br>
-              <a:rPr lang="sv-SE" dirty="0"/>
-            </a:br>
-            <a:endParaRPr lang="sv-SE" dirty="0"/>
-          </a:p>
-          <a:p>
-            <a:r>
-              <a:rPr lang="sv-SE" dirty="0"/>
-              <a:t>Där man i html skriver </a:t>
-            </a:r>
-            <a:r>
-              <a:rPr lang="sv-SE" b="1" dirty="0"/>
-              <a:t>&lt;h1&gt;Rubriktext&lt;/h1&gt; </a:t>
-            </a:r>
-            <a:r>
-              <a:rPr lang="sv-SE" dirty="0"/>
-              <a:t>med start- och sluttaggar, skrivs samma sak </a:t>
-            </a:r>
-            <a:br>
-              <a:rPr lang="sv-SE" dirty="0"/>
-            </a:br>
-            <a:r>
-              <a:rPr lang="sv-SE" b="1" dirty="0"/>
-              <a:t># Rubriktext</a:t>
-            </a:r>
-            <a:r>
-              <a:rPr lang="sv-SE" dirty="0"/>
-              <a:t> med </a:t>
-            </a:r>
-            <a:r>
-              <a:rPr lang="sv-SE" dirty="0" err="1"/>
-              <a:t>markdown</a:t>
-            </a:r>
-            <a:r>
-              <a:rPr lang="sv-SE" dirty="0"/>
-              <a:t>-syntax.</a:t>
-            </a:r>
-            <a:br>
-              <a:rPr lang="sv-SE" dirty="0"/>
-            </a:br>
-            <a:endParaRPr lang="sv-SE" dirty="0"/>
-          </a:p>
-          <a:p>
-            <a:r>
-              <a:rPr lang="sv-SE" dirty="0"/>
-              <a:t>Kika lite på grunderna i </a:t>
-            </a:r>
-            <a:r>
-              <a:rPr lang="sv-SE" dirty="0" err="1"/>
-              <a:t>markdown</a:t>
-            </a:r>
-            <a:r>
-              <a:rPr lang="sv-SE" dirty="0"/>
-              <a:t> på den här sidan:</a:t>
-            </a:r>
-          </a:p>
-          <a:p>
-            <a:pPr lvl="1"/>
-            <a:r>
-              <a:rPr lang="sv-SE" dirty="0">
-                <a:hlinkClick r:id="rId2"/>
-              </a:rPr>
-              <a:t>https://www.markdownguide.org/basic-syntax/</a:t>
-            </a:r>
-            <a:endParaRPr lang="sv-SE" dirty="0"/>
-          </a:p>
-        </p:txBody>
-      </p:sp>
+      </p:pic>
     </p:spTree>
     <p:extLst>
       <p:ext uri="{BB962C8B-B14F-4D97-AF65-F5344CB8AC3E}">
-        <p14:creationId xmlns:p14="http://schemas.microsoft.com/office/powerpoint/2010/main" val="526284289"/>
+        <p14:creationId xmlns:p14="http://schemas.microsoft.com/office/powerpoint/2010/main" val="54311030"/>
       </p:ext>
     </p:extLst>
   </p:cSld>
@@ -8358,10 +9035,10 @@
       </p:grpSpPr>
       <p:sp>
         <p:nvSpPr>
-          <p:cNvPr id="2" name="Rubrik 1">
+          <p:cNvPr id="2" name="Title 1">
             <a:extLst>
               <a:ext uri="{FF2B5EF4-FFF2-40B4-BE49-F238E27FC236}">
-                <a16:creationId xmlns:a16="http://schemas.microsoft.com/office/drawing/2014/main" id="{05C3A82D-CA9E-4A0A-87F6-169B6E2C794A}"/>
+                <a16:creationId xmlns:a16="http://schemas.microsoft.com/office/drawing/2014/main" id="{BEDA65FD-3D77-416A-B570-A96B85A76910}"/>
               </a:ext>
             </a:extLst>
           </p:cNvPr>
@@ -8379,19 +9056,11 @@
           <a:p>
             <a:r>
               <a:rPr lang="sv-SE" dirty="0"/>
-              <a:t>Del 1 - Gå igenom </a:t>
+              <a:t>Övning </a:t>
             </a:r>
             <a:r>
               <a:rPr lang="sv-SE" dirty="0" err="1"/>
-              <a:t>tailwind</a:t>
-            </a:r>
-            <a:r>
-              <a:rPr lang="sv-SE" dirty="0"/>
-              <a:t> </a:t>
-            </a:r>
-            <a:r>
-              <a:rPr lang="sv-SE" dirty="0" err="1"/>
-              <a:t>css</a:t>
+              <a:t>Nuxt</a:t>
             </a:r>
             <a:endParaRPr lang="sv-SE" dirty="0"/>
           </a:p>
@@ -8399,10 +9068,10 @@
       </p:sp>
       <p:sp>
         <p:nvSpPr>
-          <p:cNvPr id="3" name="Platshållare för innehåll 2">
+          <p:cNvPr id="3" name="Content Placeholder 2">
             <a:extLst>
               <a:ext uri="{FF2B5EF4-FFF2-40B4-BE49-F238E27FC236}">
-                <a16:creationId xmlns:a16="http://schemas.microsoft.com/office/drawing/2014/main" id="{78144C54-324B-4092-9293-999171D88805}"/>
+                <a16:creationId xmlns:a16="http://schemas.microsoft.com/office/drawing/2014/main" id="{B797C07C-5FAB-47E0-BF92-B1D9F66B769E}"/>
               </a:ext>
             </a:extLst>
           </p:cNvPr>
@@ -8415,8 +9084,8 @@
         </p:nvSpPr>
         <p:spPr>
           <a:xfrm>
-            <a:off x="1251678" y="1744911"/>
-            <a:ext cx="10178322" cy="4134682"/>
+            <a:off x="1251678" y="1311565"/>
+            <a:ext cx="10178322" cy="4568028"/>
           </a:xfrm>
         </p:spPr>
         <p:txBody>
@@ -8425,21 +9094,11 @@
           <a:p>
             <a:r>
               <a:rPr lang="sv-SE" dirty="0" err="1"/>
-              <a:t>Tailwind</a:t>
-            </a:r>
-            <a:r>
-              <a:rPr lang="sv-SE" dirty="0"/>
-              <a:t> CSS är ett CSS bibliotek som tillhandahåller en mängd klasser som gör det enkelt att applicera CSS på applikationer.</a:t>
-            </a:r>
-          </a:p>
-          <a:p>
-            <a:r>
-              <a:rPr lang="sv-SE" dirty="0" err="1"/>
-              <a:t>Tailwind</a:t>
-            </a:r>
-            <a:r>
-              <a:rPr lang="sv-SE" dirty="0"/>
-              <a:t> CSS hemsida</a:t>
+              <a:t>Resultatmall</a:t>
+            </a:r>
+            <a:r>
+              <a:rPr lang="sv-SE" dirty="0"/>
+              <a:t> hemsida för övningen</a:t>
             </a:r>
           </a:p>
           <a:p>
@@ -8448,97 +9107,157 @@
               <a:rPr lang="sv-SE" dirty="0">
                 <a:hlinkClick r:id="rId2"/>
               </a:rPr>
-              <a:t>https://tailwindcss.com/</a:t>
+              <a:t>https://www.w3schools.com/w3css/tryw3css_templates_food_blog.htm </a:t>
             </a:r>
             <a:endParaRPr lang="sv-SE" dirty="0"/>
           </a:p>
           <a:p>
-            <a:r>
-              <a:rPr lang="sv-SE" dirty="0"/>
-              <a:t>Bra video om </a:t>
+            <a:pPr marL="457200" indent="-457200">
+              <a:buFont typeface="+mj-lt"/>
+              <a:buAutoNum type="arabicPeriod"/>
+            </a:pPr>
+            <a:r>
+              <a:rPr lang="sv-SE" dirty="0"/>
+              <a:t>Skapa ett nytt </a:t>
             </a:r>
             <a:r>
               <a:rPr lang="sv-SE" dirty="0" err="1"/>
-              <a:t>Tailwind</a:t>
-            </a:r>
-            <a:r>
-              <a:rPr lang="sv-SE" dirty="0"/>
-              <a:t> och övningar:</a:t>
-            </a:r>
-          </a:p>
-          <a:p>
-            <a:pPr lvl="1"/>
-            <a:r>
-              <a:rPr lang="sv-SE" dirty="0">
-                <a:hlinkClick r:id="rId3"/>
-              </a:rPr>
-              <a:t>https://www.youtube.com/watch?v=4wGmylafgM4</a:t>
-            </a:r>
+              <a:t>Nuxt</a:t>
+            </a:r>
+            <a:r>
+              <a:rPr lang="sv-SE" dirty="0"/>
+              <a:t> projekt och välj alternativen enligt bilden på föregående </a:t>
+            </a:r>
+            <a:r>
+              <a:rPr lang="sv-SE" dirty="0" err="1"/>
+              <a:t>slide</a:t>
+            </a:r>
+            <a:r>
+              <a:rPr lang="sv-SE" dirty="0"/>
+              <a:t>.</a:t>
+            </a:r>
+          </a:p>
+          <a:p>
+            <a:pPr marL="457200" indent="-457200">
+              <a:buFont typeface="+mj-lt"/>
+              <a:buAutoNum type="arabicPeriod"/>
+            </a:pPr>
+            <a:r>
+              <a:rPr lang="sv-SE" dirty="0"/>
+              <a:t>Lägg till en layouts-mapp och en </a:t>
+            </a:r>
+            <a:r>
+              <a:rPr lang="sv-SE" dirty="0" err="1"/>
+              <a:t>default.vue</a:t>
+            </a:r>
+            <a:r>
+              <a:rPr lang="sv-SE" dirty="0"/>
+              <a:t> </a:t>
+            </a:r>
+            <a:r>
+              <a:rPr lang="sv-SE" dirty="0" err="1"/>
+              <a:t>component</a:t>
+            </a:r>
+            <a:r>
+              <a:rPr lang="sv-SE" dirty="0"/>
+              <a:t> för att vara layout för hela sidan.</a:t>
+            </a:r>
+          </a:p>
+          <a:p>
+            <a:pPr marL="457200" indent="-457200">
+              <a:buFont typeface="+mj-lt"/>
+              <a:buAutoNum type="arabicPeriod"/>
+            </a:pPr>
+            <a:r>
+              <a:rPr lang="sv-SE" dirty="0"/>
+              <a:t>Skapa 3 sidor som det ska gå att navigera i mellan </a:t>
+            </a:r>
+          </a:p>
+          <a:p>
+            <a:pPr marL="914400" lvl="1" indent="-457200">
+              <a:buFont typeface="+mj-lt"/>
+              <a:buAutoNum type="arabicPeriod"/>
+            </a:pPr>
+            <a:r>
+              <a:rPr lang="sv-SE" b="1" dirty="0" err="1"/>
+              <a:t>index.vue</a:t>
+            </a:r>
+            <a:r>
+              <a:rPr lang="sv-SE" b="1" dirty="0"/>
+              <a:t> – </a:t>
+            </a:r>
+            <a:r>
+              <a:rPr lang="sv-SE" dirty="0"/>
+              <a:t>startsidan med alla rätter enligt länk. </a:t>
+            </a:r>
+          </a:p>
+          <a:p>
+            <a:pPr marL="914400" lvl="1" indent="-457200">
+              <a:buFont typeface="+mj-lt"/>
+              <a:buAutoNum type="arabicPeriod"/>
+            </a:pPr>
+            <a:r>
+              <a:rPr lang="sv-SE" b="1" dirty="0" err="1"/>
+              <a:t>dish-details.vue</a:t>
+            </a:r>
+            <a:r>
+              <a:rPr lang="sv-SE" b="1" dirty="0"/>
+              <a:t> – </a:t>
+            </a:r>
+            <a:r>
+              <a:rPr lang="sv-SE" dirty="0"/>
+              <a:t>dynamisk sida med</a:t>
+            </a:r>
+            <a:r>
+              <a:rPr lang="sv-SE" b="1" dirty="0"/>
+              <a:t> </a:t>
+            </a:r>
+            <a:r>
+              <a:rPr lang="sv-SE" dirty="0"/>
+              <a:t>detaljerad information om rätten, genom att klicka på en rätt i listan ska man hämna där.</a:t>
+            </a:r>
+            <a:endParaRPr lang="sv-SE" b="1" dirty="0"/>
+          </a:p>
+          <a:p>
+            <a:pPr marL="914400" lvl="1" indent="-457200">
+              <a:buFont typeface="+mj-lt"/>
+              <a:buAutoNum type="arabicPeriod"/>
+            </a:pPr>
+            <a:r>
+              <a:rPr lang="sv-SE" b="1" dirty="0" err="1"/>
+              <a:t>about-us.vue</a:t>
+            </a:r>
+            <a:r>
+              <a:rPr lang="sv-SE" b="1" dirty="0"/>
+              <a:t> – </a:t>
+            </a:r>
+            <a:r>
+              <a:rPr lang="sv-SE" dirty="0"/>
+              <a:t>en om oss</a:t>
+            </a:r>
+            <a:r>
+              <a:rPr lang="sv-SE" b="1" dirty="0"/>
+              <a:t> </a:t>
+            </a:r>
+            <a:r>
+              <a:rPr lang="sv-SE" dirty="0"/>
+              <a:t>sida med information om restaurangen.</a:t>
+            </a:r>
+            <a:endParaRPr lang="sv-SE" b="1" dirty="0"/>
+          </a:p>
+          <a:p>
+            <a:pPr marL="457200" indent="-457200">
+              <a:buFont typeface="+mj-lt"/>
+              <a:buAutoNum type="arabicPeriod"/>
+            </a:pPr>
             <a:endParaRPr lang="sv-SE" dirty="0"/>
           </a:p>
-          <a:p>
-            <a:r>
-              <a:rPr lang="sv-SE" dirty="0" err="1"/>
-              <a:t>Pdf:en</a:t>
-            </a:r>
-            <a:r>
-              <a:rPr lang="sv-SE" dirty="0"/>
-              <a:t> till videon finns i samma mapp som den här presentationen. </a:t>
-            </a:r>
-          </a:p>
         </p:txBody>
       </p:sp>
-      <p:pic>
-        <p:nvPicPr>
-          <p:cNvPr id="3074" name="Picture 2" descr="11 Benefits of Tailwind CSS | Laravel News">
-            <a:extLst>
-              <a:ext uri="{FF2B5EF4-FFF2-40B4-BE49-F238E27FC236}">
-                <a16:creationId xmlns:a16="http://schemas.microsoft.com/office/drawing/2014/main" id="{30893E99-B6F8-41DF-8634-26E25DFF94EF}"/>
-              </a:ext>
-            </a:extLst>
-          </p:cNvPr>
-          <p:cNvPicPr>
-            <a:picLocks noChangeAspect="1" noChangeArrowheads="1"/>
-          </p:cNvPicPr>
-          <p:nvPr/>
-        </p:nvPicPr>
-        <p:blipFill>
-          <a:blip r:embed="rId4">
-            <a:extLst>
-              <a:ext uri="{28A0092B-C50C-407E-A947-70E740481C1C}">
-                <a14:useLocalDpi xmlns:a14="http://schemas.microsoft.com/office/drawing/2010/main" val="0"/>
-              </a:ext>
-            </a:extLst>
-          </a:blip>
-          <a:srcRect/>
-          <a:stretch>
-            <a:fillRect/>
-          </a:stretch>
-        </p:blipFill>
-        <p:spPr bwMode="auto">
-          <a:xfrm>
-            <a:off x="7518689" y="4961140"/>
-            <a:ext cx="3028950" cy="1514475"/>
-          </a:xfrm>
-          <a:prstGeom prst="rect">
-            <a:avLst/>
-          </a:prstGeom>
-          <a:noFill/>
-          <a:extLst>
-            <a:ext uri="{909E8E84-426E-40DD-AFC4-6F175D3DCCD1}">
-              <a14:hiddenFill xmlns:a14="http://schemas.microsoft.com/office/drawing/2010/main">
-                <a:solidFill>
-                  <a:srgbClr val="FFFFFF"/>
-                </a:solidFill>
-              </a14:hiddenFill>
-            </a:ext>
-          </a:extLst>
-        </p:spPr>
-      </p:pic>
     </p:spTree>
     <p:extLst>
       <p:ext uri="{BB962C8B-B14F-4D97-AF65-F5344CB8AC3E}">
-        <p14:creationId xmlns:p14="http://schemas.microsoft.com/office/powerpoint/2010/main" val="1683908177"/>
+        <p14:creationId xmlns:p14="http://schemas.microsoft.com/office/powerpoint/2010/main" val="434721147"/>
       </p:ext>
     </p:extLst>
   </p:cSld>
@@ -8570,7 +9289,7 @@
           <p:cNvPr id="2" name="Rubrik 1">
             <a:extLst>
               <a:ext uri="{FF2B5EF4-FFF2-40B4-BE49-F238E27FC236}">
-                <a16:creationId xmlns:a16="http://schemas.microsoft.com/office/drawing/2014/main" id="{9F0ADFF8-1E17-4F74-BA67-DB5F579A07F5}"/>
+                <a16:creationId xmlns:a16="http://schemas.microsoft.com/office/drawing/2014/main" id="{A1B76055-3CFF-4EC0-B3F0-EF5DC34CA8A6}"/>
               </a:ext>
             </a:extLst>
           </p:cNvPr>
@@ -8592,15 +9311,7 @@
             </a:r>
             <a:r>
               <a:rPr lang="sv-SE" dirty="0" err="1"/>
-              <a:t>nuxt</a:t>
-            </a:r>
-            <a:r>
-              <a:rPr lang="sv-SE" dirty="0"/>
-              <a:t> </a:t>
-            </a:r>
-            <a:r>
-              <a:rPr lang="sv-SE" dirty="0" err="1"/>
-              <a:t>content</a:t>
+              <a:t>Markdown</a:t>
             </a:r>
             <a:endParaRPr lang="sv-SE" dirty="0"/>
           </a:p>
@@ -8611,7 +9322,7 @@
           <p:cNvPr id="3" name="Platshållare för innehåll 2">
             <a:extLst>
               <a:ext uri="{FF2B5EF4-FFF2-40B4-BE49-F238E27FC236}">
-                <a16:creationId xmlns:a16="http://schemas.microsoft.com/office/drawing/2014/main" id="{8DE49576-57BB-46F0-8576-44762A044073}"/>
+                <a16:creationId xmlns:a16="http://schemas.microsoft.com/office/drawing/2014/main" id="{A87E6BA1-2E29-47B1-B6F5-CFADF72C07C0}"/>
               </a:ext>
             </a:extLst>
           </p:cNvPr>
@@ -8622,101 +9333,140 @@
             <p:ph idx="1"/>
           </p:nvPr>
         </p:nvSpPr>
-        <p:spPr/>
+        <p:spPr>
+          <a:xfrm>
+            <a:off x="1251678" y="1342239"/>
+            <a:ext cx="10178322" cy="5301842"/>
+          </a:xfrm>
+        </p:spPr>
         <p:txBody>
           <a:bodyPr/>
           <a:lstStyle/>
           <a:p>
             <a:r>
               <a:rPr lang="sv-SE" dirty="0" err="1"/>
-              <a:t>Nuxt</a:t>
-            </a:r>
-            <a:r>
-              <a:rPr lang="sv-SE" dirty="0"/>
-              <a:t> </a:t>
+              <a:t>Markdown</a:t>
+            </a:r>
+            <a:r>
+              <a:rPr lang="sv-SE" dirty="0"/>
+              <a:t> är ett märkspråk för ren text som sedan kan konverteras till många olika format (</a:t>
             </a:r>
             <a:r>
               <a:rPr lang="sv-SE" dirty="0" err="1"/>
-              <a:t>Content</a:t>
-            </a:r>
-            <a:r>
-              <a:rPr lang="sv-SE" dirty="0"/>
-              <a:t> är en modul i </a:t>
+              <a:t>pdf</a:t>
+            </a:r>
+            <a:r>
+              <a:rPr lang="sv-SE" dirty="0"/>
+              <a:t>, HTML, </a:t>
             </a:r>
             <a:r>
               <a:rPr lang="sv-SE" dirty="0" err="1"/>
-              <a:t>Nuxt</a:t>
-            </a:r>
-            <a:r>
-              <a:rPr lang="sv-SE" dirty="0"/>
-              <a:t> som tillåter oss läsa in innehållet i olika filer genom ett smidigt API.</a:t>
-            </a:r>
-          </a:p>
-          <a:p>
+              <a:t>wordfil</a:t>
+            </a:r>
+            <a:r>
+              <a:rPr lang="sv-SE" dirty="0"/>
+              <a:t>)</a:t>
+            </a:r>
+            <a:br>
+              <a:rPr lang="sv-SE" dirty="0"/>
+            </a:br>
+            <a:endParaRPr lang="sv-SE" dirty="0"/>
+          </a:p>
+          <a:p>
+            <a:r>
+              <a:rPr lang="sv-SE" dirty="0"/>
+              <a:t>Syftet med </a:t>
+            </a:r>
+            <a:r>
+              <a:rPr lang="sv-SE" dirty="0" err="1"/>
+              <a:t>markdown</a:t>
+            </a:r>
+            <a:r>
+              <a:rPr lang="sv-SE" dirty="0"/>
+              <a:t> är att man enkelt ska kunna läsa och skriva läsbar ren text, men med möjligheten att sedan kunna konvertera texten till strukturerad, rik text.</a:t>
+            </a:r>
+            <a:br>
+              <a:rPr lang="sv-SE" dirty="0"/>
+            </a:br>
+            <a:endParaRPr lang="sv-SE" dirty="0"/>
+          </a:p>
+          <a:p>
+            <a:r>
+              <a:rPr lang="sv-SE" dirty="0"/>
+              <a:t>Syntaxen för att formatera texten för fet och kursiv stil, rubriker och punktlistor är förenklad jämfört med html-kod.</a:t>
+            </a:r>
+            <a:br>
+              <a:rPr lang="sv-SE" dirty="0"/>
+            </a:br>
+            <a:endParaRPr lang="sv-SE" dirty="0"/>
+          </a:p>
+          <a:p>
+            <a:r>
+              <a:rPr lang="sv-SE" dirty="0"/>
+              <a:t>Där man i html skriver </a:t>
+            </a:r>
+            <a:r>
+              <a:rPr lang="sv-SE" b="1" dirty="0"/>
+              <a:t>&lt;h1&gt;Rubriktext&lt;/h1&gt; </a:t>
+            </a:r>
+            <a:r>
+              <a:rPr lang="sv-SE" dirty="0"/>
+              <a:t>med start- och sluttaggar, skrivs samma sak </a:t>
+            </a:r>
+            <a:br>
+              <a:rPr lang="sv-SE" dirty="0"/>
+            </a:br>
+            <a:r>
+              <a:rPr lang="sv-SE" b="1" dirty="0"/>
+              <a:t># Rubriktext</a:t>
+            </a:r>
+            <a:r>
+              <a:rPr lang="sv-SE" dirty="0"/>
+              <a:t> med </a:t>
+            </a:r>
+            <a:r>
+              <a:rPr lang="sv-SE" dirty="0" err="1"/>
+              <a:t>markdown</a:t>
+            </a:r>
+            <a:r>
+              <a:rPr lang="sv-SE" dirty="0"/>
+              <a:t>-syntax.</a:t>
+            </a:r>
+            <a:br>
+              <a:rPr lang="sv-SE" dirty="0"/>
+            </a:br>
+            <a:endParaRPr lang="sv-SE" dirty="0"/>
+          </a:p>
+          <a:p>
+            <a:r>
+              <a:rPr lang="sv-SE" dirty="0"/>
+              <a:t>Kika lite på grunderna i </a:t>
+            </a:r>
+            <a:r>
+              <a:rPr lang="sv-SE" dirty="0" err="1"/>
+              <a:t>markdown</a:t>
+            </a:r>
+            <a:r>
+              <a:rPr lang="sv-SE" dirty="0"/>
+              <a:t> på den här sidan:</a:t>
+            </a:r>
+          </a:p>
+          <a:p>
+            <a:pPr lvl="1"/>
             <a:r>
               <a:rPr lang="sv-SE" dirty="0">
                 <a:hlinkClick r:id="rId2"/>
               </a:rPr>
-              <a:t>https://content.nuxtjs.org/</a:t>
+              <a:t>https://www.markdownguide.org/basic-syntax/</a:t>
             </a:r>
             <a:endParaRPr lang="sv-SE" dirty="0"/>
           </a:p>
-          <a:p>
-            <a:endParaRPr lang="sv-SE" dirty="0"/>
-          </a:p>
         </p:txBody>
       </p:sp>
-      <p:pic>
-        <p:nvPicPr>
-          <p:cNvPr id="5122" name="Picture 2" descr="nuxt/content - npm">
-            <a:extLst>
-              <a:ext uri="{FF2B5EF4-FFF2-40B4-BE49-F238E27FC236}">
-                <a16:creationId xmlns:a16="http://schemas.microsoft.com/office/drawing/2014/main" id="{2A127A15-05E4-4157-A58C-0C51DF09665D}"/>
-              </a:ext>
-            </a:extLst>
-          </p:cNvPr>
-          <p:cNvPicPr>
-            <a:picLocks noChangeAspect="1" noChangeArrowheads="1"/>
-          </p:cNvPicPr>
-          <p:nvPr/>
-        </p:nvPicPr>
-        <p:blipFill>
-          <a:blip r:embed="rId3">
-            <a:extLst>
-              <a:ext uri="{28A0092B-C50C-407E-A947-70E740481C1C}">
-                <a14:useLocalDpi xmlns:a14="http://schemas.microsoft.com/office/drawing/2010/main" val="0"/>
-              </a:ext>
-            </a:extLst>
-          </a:blip>
-          <a:srcRect/>
-          <a:stretch>
-            <a:fillRect/>
-          </a:stretch>
-        </p:blipFill>
-        <p:spPr bwMode="auto">
-          <a:xfrm>
-            <a:off x="4815280" y="3214864"/>
-            <a:ext cx="6890158" cy="3445079"/>
-          </a:xfrm>
-          <a:prstGeom prst="rect">
-            <a:avLst/>
-          </a:prstGeom>
-          <a:noFill/>
-          <a:extLst>
-            <a:ext uri="{909E8E84-426E-40DD-AFC4-6F175D3DCCD1}">
-              <a14:hiddenFill xmlns:a14="http://schemas.microsoft.com/office/drawing/2010/main">
-                <a:solidFill>
-                  <a:srgbClr val="FFFFFF"/>
-                </a:solidFill>
-              </a14:hiddenFill>
-            </a:ext>
-          </a:extLst>
-        </p:spPr>
-      </p:pic>
     </p:spTree>
     <p:extLst>
       <p:ext uri="{BB962C8B-B14F-4D97-AF65-F5344CB8AC3E}">
-        <p14:creationId xmlns:p14="http://schemas.microsoft.com/office/powerpoint/2010/main" val="2592613988"/>
+        <p14:creationId xmlns:p14="http://schemas.microsoft.com/office/powerpoint/2010/main" val="526284289"/>
       </p:ext>
     </p:extLst>
   </p:cSld>

</xml_diff>